<commit_message>
module 7 and ps07 ready for release
</commit_message>
<xml_diff>
--- a/Slides/Lesson 7.2 More Examples of Invariants.pptx
+++ b/Slides/Lesson 7.2 More Examples of Invariants.pptx
@@ -225,7 +225,7 @@
           <a:p>
             <a:fld id="{CA5085ED-56B4-45A6-801A-98AC77E76501}" type="datetimeFigureOut">
               <a:rPr lang="en-US" smtClean="0"/>
-              <a:t>10/15/2016</a:t>
+              <a:t>10/23/2016</a:t>
             </a:fld>
             <a:endParaRPr lang="en-US"/>
           </a:p>
@@ -1188,7 +1188,7 @@
           <a:p>
             <a:fld id="{2F1F79F5-7BEC-496A-AFC7-876E38F64D71}" type="datetime1">
               <a:rPr lang="en-US" smtClean="0"/>
-              <a:t>10/15/2016</a:t>
+              <a:t>10/23/2016</a:t>
             </a:fld>
             <a:endParaRPr lang="en-US"/>
           </a:p>
@@ -1283,7 +1283,7 @@
           <a:p>
             <a:fld id="{0A05703A-7669-4FEA-9056-25299B4D29D4}" type="datetime1">
               <a:rPr lang="en-US" smtClean="0"/>
-              <a:t>10/15/2016</a:t>
+              <a:t>10/23/2016</a:t>
             </a:fld>
             <a:endParaRPr lang="en-US"/>
           </a:p>
@@ -1558,7 +1558,7 @@
           <a:p>
             <a:fld id="{6E5077B5-BB57-49DB-88CA-226A139E5C01}" type="datetime1">
               <a:rPr lang="en-US" smtClean="0"/>
-              <a:t>10/15/2016</a:t>
+              <a:t>10/23/2016</a:t>
             </a:fld>
             <a:endParaRPr lang="en-US"/>
           </a:p>
@@ -1810,7 +1810,7 @@
           <a:p>
             <a:fld id="{C48D9447-CBD6-49A1-89FD-8512A8CF8999}" type="datetime1">
               <a:rPr lang="en-US" smtClean="0"/>
-              <a:t>10/15/2016</a:t>
+              <a:t>10/23/2016</a:t>
             </a:fld>
             <a:endParaRPr lang="en-US"/>
           </a:p>
@@ -1978,7 +1978,7 @@
           <a:p>
             <a:fld id="{A3639A2A-823D-48B7-9ACE-7FAF42870BA9}" type="datetime1">
               <a:rPr lang="en-US" smtClean="0"/>
-              <a:t>10/15/2016</a:t>
+              <a:t>10/23/2016</a:t>
             </a:fld>
             <a:endParaRPr lang="en-US"/>
           </a:p>
@@ -2156,7 +2156,7 @@
           <a:p>
             <a:fld id="{ED1B6996-82E9-463C-972C-7B56056E426C}" type="datetime1">
               <a:rPr lang="en-US" smtClean="0"/>
-              <a:t>10/15/2016</a:t>
+              <a:t>10/23/2016</a:t>
             </a:fld>
             <a:endParaRPr lang="en-US"/>
           </a:p>
@@ -2330,7 +2330,7 @@
           <a:p>
             <a:fld id="{E22ED4DA-448D-4BB1-B935-CC112220207B}" type="datetime1">
               <a:rPr lang="en-US" smtClean="0"/>
-              <a:t>10/15/2016</a:t>
+              <a:t>10/23/2016</a:t>
             </a:fld>
             <a:endParaRPr lang="en-US"/>
           </a:p>
@@ -2503,7 +2503,7 @@
           <a:p>
             <a:fld id="{E22ED4DA-448D-4BB1-B935-CC112220207B}" type="datetime1">
               <a:rPr lang="en-US" smtClean="0"/>
-              <a:t>10/15/2016</a:t>
+              <a:t>10/23/2016</a:t>
             </a:fld>
             <a:endParaRPr lang="en-US"/>
           </a:p>
@@ -2763,7 +2763,7 @@
           <a:p>
             <a:fld id="{FF5D65A6-AB94-4435-B0B7-3743215FA46C}" type="datetime1">
               <a:rPr lang="en-US" smtClean="0"/>
-              <a:t>10/15/2016</a:t>
+              <a:t>10/23/2016</a:t>
             </a:fld>
             <a:endParaRPr lang="en-US"/>
           </a:p>
@@ -2939,7 +2939,7 @@
           <a:p>
             <a:fld id="{FF5D65A6-AB94-4435-B0B7-3743215FA46C}" type="datetime1">
               <a:rPr lang="en-US" smtClean="0"/>
-              <a:t>10/15/2016</a:t>
+              <a:t>10/23/2016</a:t>
             </a:fld>
             <a:endParaRPr lang="en-US"/>
           </a:p>
@@ -3233,7 +3233,7 @@
           <a:p>
             <a:fld id="{7C193DC4-6EF0-48C9-B29C-616106A645E1}" type="datetime1">
               <a:rPr lang="en-US" smtClean="0"/>
-              <a:t>10/15/2016</a:t>
+              <a:t>10/23/2016</a:t>
             </a:fld>
             <a:endParaRPr lang="en-US"/>
           </a:p>
@@ -3518,7 +3518,7 @@
           <a:p>
             <a:fld id="{5D1846AD-9252-4647-9435-4C2AC365653A}" type="datetime1">
               <a:rPr lang="en-US" smtClean="0"/>
-              <a:t>10/15/2016</a:t>
+              <a:t>10/23/2016</a:t>
             </a:fld>
             <a:endParaRPr lang="en-US"/>
           </a:p>
@@ -3937,7 +3937,7 @@
           <a:p>
             <a:fld id="{CE56DC10-3561-4063-A6AF-C1CC7A41040A}" type="datetime1">
               <a:rPr lang="en-US" smtClean="0"/>
-              <a:t>10/15/2016</a:t>
+              <a:t>10/23/2016</a:t>
             </a:fld>
             <a:endParaRPr lang="en-US"/>
           </a:p>
@@ -4054,7 +4054,7 @@
           <a:p>
             <a:fld id="{2F7B77F5-1464-4F6B-92A8-64FC8A508293}" type="datetime1">
               <a:rPr lang="en-US" smtClean="0"/>
-              <a:t>10/15/2016</a:t>
+              <a:t>10/23/2016</a:t>
             </a:fld>
             <a:endParaRPr lang="en-US"/>
           </a:p>
@@ -4277,7 +4277,7 @@
           <a:p>
             <a:fld id="{02B3F677-983B-48DB-ADFD-63FE6CBC7FB2}" type="datetime1">
               <a:rPr lang="en-US" smtClean="0"/>
-              <a:t>10/15/2016</a:t>
+              <a:t>10/23/2016</a:t>
             </a:fld>
             <a:endParaRPr lang="en-US"/>
           </a:p>
@@ -4808,7 +4808,7 @@
             <a:p>
               <a:r>
                 <a:rPr lang="en-US" sz="1000" dirty="0"/>
-                <a:t>© Mitchell Wand, 2012-2016</a:t>
+                <a:t>© Mitchell Wand, 2012-2015</a:t>
               </a:r>
             </a:p>
             <a:p>
@@ -5559,9 +5559,7 @@
               <a:lumOff val="60000"/>
             </a:schemeClr>
           </a:solidFill>
-          <a:ln>
-            <a:noFill/>
-          </a:ln>
+          <a:ln/>
         </p:spPr>
         <p:style>
           <a:lnRef idx="2">
@@ -5634,9 +5632,7 @@
               <a:lumOff val="60000"/>
             </a:schemeClr>
           </a:solidFill>
-          <a:ln>
-            <a:noFill/>
-          </a:ln>
+          <a:ln/>
         </p:spPr>
         <p:style>
           <a:lnRef idx="2">
@@ -5762,9 +5758,7 @@
               <a:lumOff val="60000"/>
             </a:schemeClr>
           </a:solidFill>
-          <a:ln>
-            <a:noFill/>
-          </a:ln>
+          <a:ln/>
         </p:spPr>
         <p:style>
           <a:lnRef idx="2">
@@ -6397,14 +6391,40 @@
           <a:prstGeom prst="rect">
             <a:avLst/>
           </a:prstGeom>
-          <a:solidFill>
-            <a:schemeClr val="accent3">
-              <a:lumMod val="40000"/>
-              <a:lumOff val="60000"/>
-            </a:schemeClr>
-          </a:solidFill>
+          <a:gradFill flip="none" rotWithShape="1">
+            <a:gsLst>
+              <a:gs pos="0">
+                <a:schemeClr val="accent3">
+                  <a:lumMod val="60000"/>
+                  <a:lumOff val="40000"/>
+                  <a:tint val="66000"/>
+                  <a:satMod val="160000"/>
+                </a:schemeClr>
+              </a:gs>
+              <a:gs pos="50000">
+                <a:schemeClr val="accent3">
+                  <a:lumMod val="60000"/>
+                  <a:lumOff val="40000"/>
+                  <a:tint val="44500"/>
+                  <a:satMod val="160000"/>
+                </a:schemeClr>
+              </a:gs>
+              <a:gs pos="100000">
+                <a:schemeClr val="accent3">
+                  <a:lumMod val="60000"/>
+                  <a:lumOff val="40000"/>
+                  <a:tint val="23500"/>
+                  <a:satMod val="160000"/>
+                </a:schemeClr>
+              </a:gs>
+            </a:gsLst>
+            <a:lin ang="5400000" scaled="1"/>
+            <a:tileRect/>
+          </a:gradFill>
           <a:ln w="12700">
-            <a:noFill/>
+            <a:solidFill>
+              <a:schemeClr val="tx1"/>
+            </a:solidFill>
           </a:ln>
         </p:spPr>
         <p:style>
@@ -6486,14 +6506,40 @@
           <a:prstGeom prst="rect">
             <a:avLst/>
           </a:prstGeom>
-          <a:solidFill>
-            <a:schemeClr val="accent3">
-              <a:lumMod val="40000"/>
-              <a:lumOff val="60000"/>
-            </a:schemeClr>
-          </a:solidFill>
+          <a:gradFill flip="none" rotWithShape="1">
+            <a:gsLst>
+              <a:gs pos="0">
+                <a:schemeClr val="accent3">
+                  <a:lumMod val="60000"/>
+                  <a:lumOff val="40000"/>
+                  <a:tint val="66000"/>
+                  <a:satMod val="160000"/>
+                </a:schemeClr>
+              </a:gs>
+              <a:gs pos="50000">
+                <a:schemeClr val="accent3">
+                  <a:lumMod val="60000"/>
+                  <a:lumOff val="40000"/>
+                  <a:tint val="44500"/>
+                  <a:satMod val="160000"/>
+                </a:schemeClr>
+              </a:gs>
+              <a:gs pos="100000">
+                <a:schemeClr val="accent3">
+                  <a:lumMod val="60000"/>
+                  <a:lumOff val="40000"/>
+                  <a:tint val="23500"/>
+                  <a:satMod val="160000"/>
+                </a:schemeClr>
+              </a:gs>
+            </a:gsLst>
+            <a:lin ang="5400000" scaled="1"/>
+            <a:tileRect/>
+          </a:gradFill>
           <a:ln w="12700">
-            <a:noFill/>
+            <a:solidFill>
+              <a:schemeClr val="tx1"/>
+            </a:solidFill>
           </a:ln>
         </p:spPr>
         <p:style>
@@ -6547,9 +6593,7 @@
               <a:lumOff val="60000"/>
             </a:schemeClr>
           </a:solidFill>
-          <a:ln>
-            <a:noFill/>
-          </a:ln>
+          <a:ln/>
         </p:spPr>
         <p:style>
           <a:lnRef idx="2">
@@ -6881,9 +6925,7 @@
               <a:lumOff val="60000"/>
             </a:schemeClr>
           </a:solidFill>
-          <a:ln>
-            <a:noFill/>
-          </a:ln>
+          <a:ln/>
         </p:spPr>
         <p:style>
           <a:lnRef idx="2">
@@ -7010,9 +7052,7 @@
               <a:lumOff val="60000"/>
             </a:schemeClr>
           </a:solidFill>
-          <a:ln>
-            <a:noFill/>
-          </a:ln>
+          <a:ln/>
         </p:spPr>
         <p:style>
           <a:lnRef idx="2">
@@ -7585,7 +7625,7 @@
                 <a:latin typeface="Consolas" pitchFamily="49" charset="0"/>
                 <a:cs typeface="Consolas" pitchFamily="49" charset="0"/>
               </a:rPr>
-              <a:t>BinTreeOfX</a:t>
+              <a:t>BintreeOfX</a:t>
             </a:r>
             <a:r>
               <a:rPr lang="en-US" sz="2400" b="1" dirty="0">
@@ -7637,7 +7677,7 @@
                 <a:latin typeface="Consolas" pitchFamily="49" charset="0"/>
                 <a:cs typeface="Consolas" pitchFamily="49" charset="0"/>
               </a:rPr>
-              <a:t>BinTreeOfX</a:t>
+              <a:t>BintreeOfX</a:t>
             </a:r>
             <a:r>
               <a:rPr lang="en-US" sz="2400" b="1" dirty="0">
@@ -7651,7 +7691,7 @@
                 <a:latin typeface="Consolas" pitchFamily="49" charset="0"/>
                 <a:cs typeface="Consolas" pitchFamily="49" charset="0"/>
               </a:rPr>
-              <a:t>BinTreeOfX</a:t>
+              <a:t>BintreeOfX</a:t>
             </a:r>
             <a:r>
               <a:rPr lang="en-US" sz="2400" b="1" dirty="0">
@@ -7703,7 +7743,7 @@
         </p:nvSpPr>
         <p:spPr>
           <a:xfrm>
-            <a:off x="4648200" y="4222750"/>
+            <a:off x="4648200" y="4191000"/>
             <a:ext cx="3505200" cy="2133600"/>
           </a:xfrm>
           <a:prstGeom prst="rect">
@@ -7715,9 +7755,7 @@
               <a:lumOff val="60000"/>
             </a:schemeClr>
           </a:solidFill>
-          <a:ln>
-            <a:noFill/>
-          </a:ln>
+          <a:ln/>
         </p:spPr>
         <p:style>
           <a:lnRef idx="2">
@@ -7897,7 +7935,7 @@
                 <a:latin typeface="Consolas" pitchFamily="49" charset="0"/>
                 <a:cs typeface="Consolas" pitchFamily="49" charset="0"/>
               </a:rPr>
-              <a:t>BinTreeOfX</a:t>
+              <a:t>BintreeOfX</a:t>
             </a:r>
             <a:r>
               <a:rPr lang="en-US" sz="2400" b="1" dirty="0">
@@ -9521,9 +9559,7 @@
               <a:lumOff val="60000"/>
             </a:schemeClr>
           </a:solidFill>
-          <a:ln>
-            <a:noFill/>
-          </a:ln>
+          <a:ln/>
         </p:spPr>
         <p:style>
           <a:lnRef idx="2">
@@ -9921,9 +9957,7 @@
               <a:lumOff val="60000"/>
             </a:schemeClr>
           </a:solidFill>
-          <a:ln>
-            <a:noFill/>
-          </a:ln>
+          <a:ln/>
         </p:spPr>
         <p:style>
           <a:lnRef idx="2">
@@ -10233,15 +10267,7 @@
           <a:prstGeom prst="rect">
             <a:avLst/>
           </a:prstGeom>
-          <a:solidFill>
-            <a:schemeClr val="accent1">
-              <a:lumMod val="20000"/>
-              <a:lumOff val="80000"/>
-            </a:schemeClr>
-          </a:solidFill>
-          <a:ln>
-            <a:noFill/>
-          </a:ln>
+          <a:ln/>
         </p:spPr>
         <p:style>
           <a:lnRef idx="1">
@@ -10951,9 +10977,7 @@
               <a:lumOff val="60000"/>
             </a:schemeClr>
           </a:solidFill>
-          <a:ln>
-            <a:noFill/>
-          </a:ln>
+          <a:ln/>
         </p:spPr>
         <p:style>
           <a:lnRef idx="2">
@@ -11010,9 +11034,7 @@
               <a:lumOff val="60000"/>
             </a:schemeClr>
           </a:solidFill>
-          <a:ln>
-            <a:noFill/>
-          </a:ln>
+          <a:ln/>
         </p:spPr>
         <p:style>
           <a:lnRef idx="2">
@@ -11264,9 +11286,7 @@
               <a:lumOff val="60000"/>
             </a:schemeClr>
           </a:solidFill>
-          <a:ln>
-            <a:noFill/>
-          </a:ln>
+          <a:ln/>
         </p:spPr>
         <p:style>
           <a:lnRef idx="2">
@@ -12030,9 +12050,7 @@
               <a:lumOff val="60000"/>
             </a:schemeClr>
           </a:solidFill>
-          <a:ln>
-            <a:noFill/>
-          </a:ln>
+          <a:ln/>
         </p:spPr>
         <p:style>
           <a:lnRef idx="2">

</xml_diff>